<commit_message>
Updated docs + minor formatting and cleanup
no need for review.. worked with mohan on this.
</commit_message>
<xml_diff>
--- a/Tilda Tooling Architcture.pptx
+++ b/Tilda Tooling Architcture.pptx
@@ -5,7 +5,7 @@
     <p:sldMasterId id="2147483672" r:id="rId1"/>
   </p:sldMasterIdLst>
   <p:notesMasterIdLst>
-    <p:notesMasterId r:id="rId7"/>
+    <p:notesMasterId r:id="rId8"/>
   </p:notesMasterIdLst>
   <p:sldIdLst>
     <p:sldId id="256" r:id="rId2"/>
@@ -13,6 +13,7 @@
     <p:sldId id="257" r:id="rId4"/>
     <p:sldId id="258" r:id="rId5"/>
     <p:sldId id="259" r:id="rId6"/>
+    <p:sldId id="261" r:id="rId7"/>
   </p:sldIdLst>
   <p:sldSz cx="12192000" cy="6858000"/>
   <p:notesSz cx="6858000" cy="9144000"/>
@@ -201,7 +202,7 @@
           <a:p>
             <a:fld id="{74B032DE-BBB5-4125-9035-45E6835D9734}" type="datetimeFigureOut">
               <a:rPr lang="en-US" smtClean="0"/>
-              <a:t>2018-08-28</a:t>
+              <a:t>2018-08-30</a:t>
             </a:fld>
             <a:endParaRPr lang="en-US"/>
           </a:p>
@@ -20358,8 +20359,8 @@
         </p:nvSpPr>
         <p:spPr>
           <a:xfrm>
-            <a:off x="1024128" y="585216"/>
-            <a:ext cx="9720072" cy="1499616"/>
+            <a:off x="699386" y="465572"/>
+            <a:ext cx="11111601" cy="525737"/>
           </a:xfrm>
           <a:prstGeom prst="rect">
             <a:avLst/>
@@ -20372,10 +20373,9 @@
           <a:lstStyle/>
           <a:p>
             <a:r>
-              <a:rPr lang="en-US"/>
+              <a:rPr lang="en-US" dirty="0"/>
               <a:t>Click to edit Master title style</a:t>
             </a:r>
-            <a:endParaRPr lang="en-US" dirty="0"/>
           </a:p>
         </p:txBody>
       </p:sp>
@@ -20391,8 +20391,8 @@
         </p:nvSpPr>
         <p:spPr>
           <a:xfrm>
-            <a:off x="1024128" y="2286000"/>
-            <a:ext cx="9720073" cy="4023360"/>
+            <a:off x="437259" y="1264778"/>
+            <a:ext cx="11373735" cy="5044582"/>
           </a:xfrm>
           <a:prstGeom prst="rect">
             <a:avLst/>
@@ -20453,8 +20453,8 @@
         </p:nvSpPr>
         <p:spPr>
           <a:xfrm>
-            <a:off x="1024129" y="6470704"/>
-            <a:ext cx="2154143" cy="274320"/>
+            <a:off x="437259" y="6568354"/>
+            <a:ext cx="2741013" cy="176669"/>
           </a:xfrm>
           <a:prstGeom prst="rect">
             <a:avLst/>
@@ -20477,7 +20477,7 @@
           </a:lstStyle>
           <a:p>
             <a:r>
-              <a:rPr lang="en-US"/>
+              <a:rPr lang="en-US" dirty="0"/>
               <a:t>2018-08-27</a:t>
             </a:r>
           </a:p>
@@ -20495,8 +20495,8 @@
         </p:nvSpPr>
         <p:spPr>
           <a:xfrm>
-            <a:off x="4842932" y="6470704"/>
-            <a:ext cx="5901459" cy="274320"/>
+            <a:off x="3409772" y="6568354"/>
+            <a:ext cx="7334619" cy="176669"/>
           </a:xfrm>
           <a:prstGeom prst="rect">
             <a:avLst/>
@@ -20519,8 +20519,16 @@
           </a:lstStyle>
           <a:p>
             <a:r>
-              <a:rPr lang="en-US"/>
-              <a:t>Tilda Tooling - Copyright (c) 2018 CapsicoHealth, Inc. </a:t>
+              <a:rPr lang="en-US" dirty="0"/>
+              <a:t>Tilda Tooling - Copyright (c) 2018 </a:t>
+            </a:r>
+            <a:r>
+              <a:rPr lang="en-US" dirty="0" err="1"/>
+              <a:t>CapsicoHealth</a:t>
+            </a:r>
+            <a:r>
+              <a:rPr lang="en-US" dirty="0"/>
+              <a:t>, Inc. </a:t>
             </a:r>
           </a:p>
         </p:txBody>
@@ -20537,8 +20545,8 @@
         </p:nvSpPr>
         <p:spPr>
           <a:xfrm>
-            <a:off x="10837333" y="6470704"/>
-            <a:ext cx="973667" cy="274320"/>
+            <a:off x="10837333" y="6568354"/>
+            <a:ext cx="973667" cy="176670"/>
           </a:xfrm>
           <a:prstGeom prst="rect">
             <a:avLst/>
@@ -20576,7 +20584,7 @@
         </p:nvCxnSpPr>
         <p:spPr>
           <a:xfrm flipV="1">
-            <a:off x="762000" y="826324"/>
+            <a:off x="437259" y="91383"/>
             <a:ext cx="0" cy="914400"/>
           </a:xfrm>
           <a:prstGeom prst="line">
@@ -21172,7 +21180,9 @@
         </p:nvSpPr>
         <p:spPr/>
         <p:txBody>
-          <a:bodyPr/>
+          <a:bodyPr>
+            <a:normAutofit fontScale="90000"/>
+          </a:bodyPr>
           <a:lstStyle/>
           <a:p>
             <a:r>
@@ -21355,7 +21365,9 @@
         </p:nvSpPr>
         <p:spPr/>
         <p:txBody>
-          <a:bodyPr/>
+          <a:bodyPr>
+            <a:normAutofit fontScale="90000"/>
+          </a:bodyPr>
           <a:lstStyle/>
           <a:p>
             <a:r>
@@ -21792,7 +21804,9 @@
         </p:nvSpPr>
         <p:spPr/>
         <p:txBody>
-          <a:bodyPr/>
+          <a:bodyPr>
+            <a:normAutofit fontScale="90000"/>
+          </a:bodyPr>
           <a:lstStyle/>
           <a:p>
             <a:r>
@@ -21821,7 +21835,7 @@
         <p:spPr/>
         <p:txBody>
           <a:bodyPr>
-            <a:normAutofit fontScale="77500" lnSpcReduction="20000"/>
+            <a:normAutofit fontScale="92500" lnSpcReduction="10000"/>
           </a:bodyPr>
           <a:lstStyle/>
           <a:p>
@@ -22134,7 +22148,9 @@
         </p:nvSpPr>
         <p:spPr/>
         <p:txBody>
-          <a:bodyPr/>
+          <a:bodyPr>
+            <a:normAutofit fontScale="90000"/>
+          </a:bodyPr>
           <a:lstStyle/>
           <a:p>
             <a:r>
@@ -22285,6 +22301,1433 @@
     <p:extLst>
       <p:ext uri="{BB962C8B-B14F-4D97-AF65-F5344CB8AC3E}">
         <p14:creationId xmlns:p14="http://schemas.microsoft.com/office/powerpoint/2010/main" val="1484339477"/>
+      </p:ext>
+    </p:extLst>
+  </p:cSld>
+  <p:clrMapOvr>
+    <a:masterClrMapping/>
+  </p:clrMapOvr>
+</p:sld>
+</file>
+
+<file path=ppt/slides/slide6.xml><?xml version="1.0" encoding="utf-8"?>
+<p:sld xmlns:a="http://schemas.openxmlformats.org/drawingml/2006/main" xmlns:r="http://schemas.openxmlformats.org/officeDocument/2006/relationships" xmlns:p="http://schemas.openxmlformats.org/presentationml/2006/main">
+  <p:cSld>
+    <p:spTree>
+      <p:nvGrpSpPr>
+        <p:cNvPr id="1" name=""/>
+        <p:cNvGrpSpPr/>
+        <p:nvPr/>
+      </p:nvGrpSpPr>
+      <p:grpSpPr>
+        <a:xfrm>
+          <a:off x="0" y="0"/>
+          <a:ext cx="0" cy="0"/>
+          <a:chOff x="0" y="0"/>
+          <a:chExt cx="0" cy="0"/>
+        </a:xfrm>
+      </p:grpSpPr>
+      <p:sp>
+        <p:nvSpPr>
+          <p:cNvPr id="2" name="Title 1">
+            <a:extLst>
+              <a:ext uri="{FF2B5EF4-FFF2-40B4-BE49-F238E27FC236}">
+                <a16:creationId xmlns:a16="http://schemas.microsoft.com/office/drawing/2014/main" id="{FCCBEF30-8418-4EEA-9504-38B876512DAE}"/>
+              </a:ext>
+            </a:extLst>
+          </p:cNvPr>
+          <p:cNvSpPr>
+            <a:spLocks noGrp="1"/>
+          </p:cNvSpPr>
+          <p:nvPr>
+            <p:ph type="title"/>
+          </p:nvPr>
+        </p:nvSpPr>
+        <p:spPr/>
+        <p:txBody>
+          <a:bodyPr>
+            <a:normAutofit fontScale="90000"/>
+          </a:bodyPr>
+          <a:lstStyle/>
+          <a:p>
+            <a:r>
+              <a:rPr lang="en-US" dirty="0"/>
+              <a:t>Startup</a:t>
+            </a:r>
+          </a:p>
+        </p:txBody>
+      </p:sp>
+      <p:sp>
+        <p:nvSpPr>
+          <p:cNvPr id="4" name="Date Placeholder 3">
+            <a:extLst>
+              <a:ext uri="{FF2B5EF4-FFF2-40B4-BE49-F238E27FC236}">
+                <a16:creationId xmlns:a16="http://schemas.microsoft.com/office/drawing/2014/main" id="{496465B9-4FD0-464C-B74F-FECE70354532}"/>
+              </a:ext>
+            </a:extLst>
+          </p:cNvPr>
+          <p:cNvSpPr>
+            <a:spLocks noGrp="1"/>
+          </p:cNvSpPr>
+          <p:nvPr>
+            <p:ph type="dt" sz="half" idx="10"/>
+          </p:nvPr>
+        </p:nvSpPr>
+        <p:spPr/>
+        <p:txBody>
+          <a:bodyPr/>
+          <a:lstStyle/>
+          <a:p>
+            <a:r>
+              <a:rPr lang="en-US"/>
+              <a:t>2018-08-27</a:t>
+            </a:r>
+          </a:p>
+        </p:txBody>
+      </p:sp>
+      <p:sp>
+        <p:nvSpPr>
+          <p:cNvPr id="5" name="Footer Placeholder 4">
+            <a:extLst>
+              <a:ext uri="{FF2B5EF4-FFF2-40B4-BE49-F238E27FC236}">
+                <a16:creationId xmlns:a16="http://schemas.microsoft.com/office/drawing/2014/main" id="{C4962FDE-B18A-4EAE-B9AA-EF51FC4067F8}"/>
+              </a:ext>
+            </a:extLst>
+          </p:cNvPr>
+          <p:cNvSpPr>
+            <a:spLocks noGrp="1"/>
+          </p:cNvSpPr>
+          <p:nvPr>
+            <p:ph type="ftr" sz="quarter" idx="11"/>
+          </p:nvPr>
+        </p:nvSpPr>
+        <p:spPr/>
+        <p:txBody>
+          <a:bodyPr/>
+          <a:lstStyle/>
+          <a:p>
+            <a:r>
+              <a:rPr lang="en-US"/>
+              <a:t>Tilda Tooling - Copyright (c) 2018 CapsicoHealth, Inc. </a:t>
+            </a:r>
+          </a:p>
+        </p:txBody>
+      </p:sp>
+      <p:sp>
+        <p:nvSpPr>
+          <p:cNvPr id="6" name="Slide Number Placeholder 5">
+            <a:extLst>
+              <a:ext uri="{FF2B5EF4-FFF2-40B4-BE49-F238E27FC236}">
+                <a16:creationId xmlns:a16="http://schemas.microsoft.com/office/drawing/2014/main" id="{19EBB4F5-B63C-4301-8565-FD2C774461C5}"/>
+              </a:ext>
+            </a:extLst>
+          </p:cNvPr>
+          <p:cNvSpPr>
+            <a:spLocks noGrp="1"/>
+          </p:cNvSpPr>
+          <p:nvPr>
+            <p:ph type="sldNum" sz="quarter" idx="12"/>
+          </p:nvPr>
+        </p:nvSpPr>
+        <p:spPr/>
+        <p:txBody>
+          <a:bodyPr/>
+          <a:lstStyle/>
+          <a:p>
+            <a:fld id="{C70A6BF2-D208-47CE-B3CD-F52E7B740884}" type="slidenum">
+              <a:rPr lang="en-US" smtClean="0"/>
+              <a:t>6</a:t>
+            </a:fld>
+            <a:endParaRPr lang="en-US"/>
+          </a:p>
+        </p:txBody>
+      </p:sp>
+      <p:sp>
+        <p:nvSpPr>
+          <p:cNvPr id="7" name="Flowchart: Card 6">
+            <a:extLst>
+              <a:ext uri="{FF2B5EF4-FFF2-40B4-BE49-F238E27FC236}">
+                <a16:creationId xmlns:a16="http://schemas.microsoft.com/office/drawing/2014/main" id="{7F3751C3-4786-4DED-A233-86EC6B8ACA3F}"/>
+              </a:ext>
+            </a:extLst>
+          </p:cNvPr>
+          <p:cNvSpPr/>
+          <p:nvPr/>
+        </p:nvSpPr>
+        <p:spPr>
+          <a:xfrm>
+            <a:off x="854015" y="1578635"/>
+            <a:ext cx="1259457" cy="351340"/>
+          </a:xfrm>
+          <a:prstGeom prst="flowChartPunchedCard">
+            <a:avLst/>
+          </a:prstGeom>
+        </p:spPr>
+        <p:style>
+          <a:lnRef idx="2">
+            <a:schemeClr val="accent1">
+              <a:shade val="50000"/>
+            </a:schemeClr>
+          </a:lnRef>
+          <a:fillRef idx="1">
+            <a:schemeClr val="accent1"/>
+          </a:fillRef>
+          <a:effectRef idx="0">
+            <a:schemeClr val="accent1"/>
+          </a:effectRef>
+          <a:fontRef idx="minor">
+            <a:schemeClr val="lt1"/>
+          </a:fontRef>
+        </p:style>
+        <p:txBody>
+          <a:bodyPr rtlCol="0" anchor="ctr"/>
+          <a:lstStyle/>
+          <a:p>
+            <a:pPr algn="ctr"/>
+            <a:r>
+              <a:rPr lang="en-US" sz="1200" dirty="0" err="1"/>
+              <a:t>manifest.json</a:t>
+            </a:r>
+            <a:endParaRPr lang="en-US" sz="1200" dirty="0"/>
+          </a:p>
+        </p:txBody>
+      </p:sp>
+      <p:pic>
+        <p:nvPicPr>
+          <p:cNvPr id="21" name="Picture 20">
+            <a:extLst>
+              <a:ext uri="{FF2B5EF4-FFF2-40B4-BE49-F238E27FC236}">
+                <a16:creationId xmlns:a16="http://schemas.microsoft.com/office/drawing/2014/main" id="{1C98D07A-AAA6-4166-9C1C-20AD7D2ADD9A}"/>
+              </a:ext>
+            </a:extLst>
+          </p:cNvPr>
+          <p:cNvPicPr>
+            <a:picLocks noChangeAspect="1"/>
+          </p:cNvPicPr>
+          <p:nvPr/>
+        </p:nvPicPr>
+        <p:blipFill>
+          <a:blip r:embed="rId2">
+            <a:extLst>
+              <a:ext uri="{28A0092B-C50C-407E-A947-70E740481C1C}">
+                <a14:useLocalDpi xmlns:a14="http://schemas.microsoft.com/office/drawing/2010/main" val="0"/>
+              </a:ext>
+              <a:ext uri="{837473B0-CC2E-450A-ABE3-18F120FF3D39}">
+                <a1611:picAttrSrcUrl xmlns:a1611="http://schemas.microsoft.com/office/drawing/2016/11/main" r:id="rId3"/>
+              </a:ext>
+            </a:extLst>
+          </a:blip>
+          <a:stretch>
+            <a:fillRect/>
+          </a:stretch>
+        </p:blipFill>
+        <p:spPr>
+          <a:xfrm>
+            <a:off x="791191" y="1402965"/>
+            <a:ext cx="311707" cy="311707"/>
+          </a:xfrm>
+          <a:prstGeom prst="rect">
+            <a:avLst/>
+          </a:prstGeom>
+        </p:spPr>
+      </p:pic>
+      <p:cxnSp>
+        <p:nvCxnSpPr>
+          <p:cNvPr id="26" name="Connector: Elbow 25">
+            <a:extLst>
+              <a:ext uri="{FF2B5EF4-FFF2-40B4-BE49-F238E27FC236}">
+                <a16:creationId xmlns:a16="http://schemas.microsoft.com/office/drawing/2014/main" id="{740CDD64-E47F-4A87-BDF1-9E72EBC3B12F}"/>
+              </a:ext>
+            </a:extLst>
+          </p:cNvPr>
+          <p:cNvCxnSpPr>
+            <a:cxnSpLocks/>
+            <a:stCxn id="7" idx="3"/>
+            <a:endCxn id="29" idx="1"/>
+          </p:cNvCxnSpPr>
+          <p:nvPr/>
+        </p:nvCxnSpPr>
+        <p:spPr>
+          <a:xfrm flipV="1">
+            <a:off x="2113472" y="1325905"/>
+            <a:ext cx="1380167" cy="428400"/>
+          </a:xfrm>
+          <a:prstGeom prst="bentConnector3">
+            <a:avLst/>
+          </a:prstGeom>
+          <a:ln>
+            <a:tailEnd type="triangle"/>
+          </a:ln>
+        </p:spPr>
+        <p:style>
+          <a:lnRef idx="1">
+            <a:schemeClr val="accent1"/>
+          </a:lnRef>
+          <a:fillRef idx="0">
+            <a:schemeClr val="accent1"/>
+          </a:fillRef>
+          <a:effectRef idx="0">
+            <a:schemeClr val="accent1"/>
+          </a:effectRef>
+          <a:fontRef idx="minor">
+            <a:schemeClr val="tx1"/>
+          </a:fontRef>
+        </p:style>
+      </p:cxnSp>
+      <p:sp>
+        <p:nvSpPr>
+          <p:cNvPr id="29" name="Flowchart: Card 28">
+            <a:extLst>
+              <a:ext uri="{FF2B5EF4-FFF2-40B4-BE49-F238E27FC236}">
+                <a16:creationId xmlns:a16="http://schemas.microsoft.com/office/drawing/2014/main" id="{E8648E4D-7664-42FF-BA90-E7F34739C108}"/>
+              </a:ext>
+            </a:extLst>
+          </p:cNvPr>
+          <p:cNvSpPr/>
+          <p:nvPr/>
+        </p:nvSpPr>
+        <p:spPr>
+          <a:xfrm>
+            <a:off x="3493639" y="1150235"/>
+            <a:ext cx="1650520" cy="351340"/>
+          </a:xfrm>
+          <a:prstGeom prst="flowChartPunchedCard">
+            <a:avLst/>
+          </a:prstGeom>
+        </p:spPr>
+        <p:style>
+          <a:lnRef idx="2">
+            <a:schemeClr val="accent1">
+              <a:shade val="50000"/>
+            </a:schemeClr>
+          </a:lnRef>
+          <a:fillRef idx="1">
+            <a:schemeClr val="accent1"/>
+          </a:fillRef>
+          <a:effectRef idx="0">
+            <a:schemeClr val="accent1"/>
+          </a:effectRef>
+          <a:fontRef idx="minor">
+            <a:schemeClr val="lt1"/>
+          </a:fontRef>
+        </p:style>
+        <p:txBody>
+          <a:bodyPr rtlCol="0" anchor="ctr"/>
+          <a:lstStyle/>
+          <a:p>
+            <a:pPr algn="ctr"/>
+            <a:r>
+              <a:rPr lang="en-US" sz="1200" dirty="0"/>
+              <a:t>output\</a:t>
+            </a:r>
+            <a:r>
+              <a:rPr lang="en-US" sz="1200" dirty="0" err="1"/>
+              <a:t>manifest.json</a:t>
+            </a:r>
+            <a:endParaRPr lang="en-US" sz="1200" dirty="0"/>
+          </a:p>
+        </p:txBody>
+      </p:sp>
+      <p:sp>
+        <p:nvSpPr>
+          <p:cNvPr id="30" name="Flowchart: Card 29">
+            <a:extLst>
+              <a:ext uri="{FF2B5EF4-FFF2-40B4-BE49-F238E27FC236}">
+                <a16:creationId xmlns:a16="http://schemas.microsoft.com/office/drawing/2014/main" id="{CF82963A-9686-4124-89F2-A9F4BCDBC110}"/>
+              </a:ext>
+            </a:extLst>
+          </p:cNvPr>
+          <p:cNvSpPr/>
+          <p:nvPr/>
+        </p:nvSpPr>
+        <p:spPr>
+          <a:xfrm>
+            <a:off x="1015042" y="2341631"/>
+            <a:ext cx="1259457" cy="351340"/>
+          </a:xfrm>
+          <a:prstGeom prst="flowChartPunchedCard">
+            <a:avLst/>
+          </a:prstGeom>
+        </p:spPr>
+        <p:style>
+          <a:lnRef idx="2">
+            <a:schemeClr val="accent1">
+              <a:shade val="50000"/>
+            </a:schemeClr>
+          </a:lnRef>
+          <a:fillRef idx="1">
+            <a:schemeClr val="accent1"/>
+          </a:fillRef>
+          <a:effectRef idx="0">
+            <a:schemeClr val="accent1"/>
+          </a:effectRef>
+          <a:fontRef idx="minor">
+            <a:schemeClr val="lt1"/>
+          </a:fontRef>
+        </p:style>
+        <p:txBody>
+          <a:bodyPr rtlCol="0" anchor="ctr"/>
+          <a:lstStyle/>
+          <a:p>
+            <a:pPr algn="ctr"/>
+            <a:r>
+              <a:rPr lang="en-US" sz="1200" dirty="0"/>
+              <a:t>main.js</a:t>
+            </a:r>
+          </a:p>
+        </p:txBody>
+      </p:sp>
+      <p:pic>
+        <p:nvPicPr>
+          <p:cNvPr id="36" name="Picture 35">
+            <a:extLst>
+              <a:ext uri="{FF2B5EF4-FFF2-40B4-BE49-F238E27FC236}">
+                <a16:creationId xmlns:a16="http://schemas.microsoft.com/office/drawing/2014/main" id="{BCA6345A-3018-41B2-8E60-873AE2BEEE10}"/>
+              </a:ext>
+            </a:extLst>
+          </p:cNvPr>
+          <p:cNvPicPr>
+            <a:picLocks noChangeAspect="1"/>
+          </p:cNvPicPr>
+          <p:nvPr/>
+        </p:nvPicPr>
+        <p:blipFill>
+          <a:blip r:embed="rId4">
+            <a:extLst>
+              <a:ext uri="{28A0092B-C50C-407E-A947-70E740481C1C}">
+                <a14:useLocalDpi xmlns:a14="http://schemas.microsoft.com/office/drawing/2010/main" val="0"/>
+              </a:ext>
+            </a:extLst>
+          </a:blip>
+          <a:stretch>
+            <a:fillRect/>
+          </a:stretch>
+        </p:blipFill>
+        <p:spPr>
+          <a:xfrm>
+            <a:off x="2818838" y="1187662"/>
+            <a:ext cx="359434" cy="359434"/>
+          </a:xfrm>
+          <a:prstGeom prst="rect">
+            <a:avLst/>
+          </a:prstGeom>
+        </p:spPr>
+      </p:pic>
+      <p:cxnSp>
+        <p:nvCxnSpPr>
+          <p:cNvPr id="38" name="Connector: Elbow 37">
+            <a:extLst>
+              <a:ext uri="{FF2B5EF4-FFF2-40B4-BE49-F238E27FC236}">
+                <a16:creationId xmlns:a16="http://schemas.microsoft.com/office/drawing/2014/main" id="{0F1E51DE-F286-4AC5-9AD6-144D590FE945}"/>
+              </a:ext>
+            </a:extLst>
+          </p:cNvPr>
+          <p:cNvCxnSpPr>
+            <a:cxnSpLocks/>
+            <a:stCxn id="7" idx="2"/>
+            <a:endCxn id="30" idx="0"/>
+          </p:cNvCxnSpPr>
+          <p:nvPr/>
+        </p:nvCxnSpPr>
+        <p:spPr>
+          <a:xfrm rot="16200000" flipH="1">
+            <a:off x="1358429" y="2055289"/>
+            <a:ext cx="411656" cy="161027"/>
+          </a:xfrm>
+          <a:prstGeom prst="bentConnector3">
+            <a:avLst/>
+          </a:prstGeom>
+          <a:ln>
+            <a:tailEnd type="triangle"/>
+          </a:ln>
+        </p:spPr>
+        <p:style>
+          <a:lnRef idx="1">
+            <a:schemeClr val="accent1"/>
+          </a:lnRef>
+          <a:fillRef idx="0">
+            <a:schemeClr val="accent1"/>
+          </a:fillRef>
+          <a:effectRef idx="0">
+            <a:schemeClr val="accent1"/>
+          </a:effectRef>
+          <a:fontRef idx="minor">
+            <a:schemeClr val="tx1"/>
+          </a:fontRef>
+        </p:style>
+      </p:cxnSp>
+      <p:sp>
+        <p:nvSpPr>
+          <p:cNvPr id="39" name="Flowchart: Card 38">
+            <a:extLst>
+              <a:ext uri="{FF2B5EF4-FFF2-40B4-BE49-F238E27FC236}">
+                <a16:creationId xmlns:a16="http://schemas.microsoft.com/office/drawing/2014/main" id="{E37E93D4-6105-4ED6-AA5B-32DCB137FF0A}"/>
+              </a:ext>
+            </a:extLst>
+          </p:cNvPr>
+          <p:cNvSpPr/>
+          <p:nvPr/>
+        </p:nvSpPr>
+        <p:spPr>
+          <a:xfrm>
+            <a:off x="4811948" y="1735354"/>
+            <a:ext cx="1425198" cy="351340"/>
+          </a:xfrm>
+          <a:prstGeom prst="flowChartPunchedCard">
+            <a:avLst/>
+          </a:prstGeom>
+        </p:spPr>
+        <p:style>
+          <a:lnRef idx="2">
+            <a:schemeClr val="accent1">
+              <a:shade val="50000"/>
+            </a:schemeClr>
+          </a:lnRef>
+          <a:fillRef idx="1">
+            <a:schemeClr val="accent1"/>
+          </a:fillRef>
+          <a:effectRef idx="0">
+            <a:schemeClr val="accent1"/>
+          </a:effectRef>
+          <a:fontRef idx="minor">
+            <a:schemeClr val="lt1"/>
+          </a:fontRef>
+        </p:style>
+        <p:txBody>
+          <a:bodyPr rtlCol="0" anchor="ctr"/>
+          <a:lstStyle/>
+          <a:p>
+            <a:pPr algn="ctr"/>
+            <a:r>
+              <a:rPr lang="en-US" sz="1200" dirty="0"/>
+              <a:t>output\</a:t>
+            </a:r>
+            <a:r>
+              <a:rPr lang="en-US" sz="1200" dirty="0" err="1"/>
+              <a:t>js</a:t>
+            </a:r>
+            <a:r>
+              <a:rPr lang="en-US" sz="1200" dirty="0"/>
+              <a:t>\main.js</a:t>
+            </a:r>
+          </a:p>
+        </p:txBody>
+      </p:sp>
+      <p:cxnSp>
+        <p:nvCxnSpPr>
+          <p:cNvPr id="40" name="Connector: Elbow 39">
+            <a:extLst>
+              <a:ext uri="{FF2B5EF4-FFF2-40B4-BE49-F238E27FC236}">
+                <a16:creationId xmlns:a16="http://schemas.microsoft.com/office/drawing/2014/main" id="{2BD16BDF-F929-4BAC-9222-CAFE4E4FFD95}"/>
+              </a:ext>
+            </a:extLst>
+          </p:cNvPr>
+          <p:cNvCxnSpPr>
+            <a:cxnSpLocks/>
+            <a:stCxn id="29" idx="2"/>
+            <a:endCxn id="39" idx="1"/>
+          </p:cNvCxnSpPr>
+          <p:nvPr/>
+        </p:nvCxnSpPr>
+        <p:spPr>
+          <a:xfrm rot="16200000" flipH="1">
+            <a:off x="4360699" y="1459774"/>
+            <a:ext cx="409449" cy="493049"/>
+          </a:xfrm>
+          <a:prstGeom prst="bentConnector2">
+            <a:avLst/>
+          </a:prstGeom>
+          <a:ln>
+            <a:tailEnd type="triangle"/>
+          </a:ln>
+        </p:spPr>
+        <p:style>
+          <a:lnRef idx="1">
+            <a:schemeClr val="accent1"/>
+          </a:lnRef>
+          <a:fillRef idx="0">
+            <a:schemeClr val="accent1"/>
+          </a:fillRef>
+          <a:effectRef idx="0">
+            <a:schemeClr val="accent1"/>
+          </a:effectRef>
+          <a:fontRef idx="minor">
+            <a:schemeClr val="tx1"/>
+          </a:fontRef>
+        </p:style>
+      </p:cxnSp>
+      <p:pic>
+        <p:nvPicPr>
+          <p:cNvPr id="48" name="Picture 47">
+            <a:extLst>
+              <a:ext uri="{FF2B5EF4-FFF2-40B4-BE49-F238E27FC236}">
+                <a16:creationId xmlns:a16="http://schemas.microsoft.com/office/drawing/2014/main" id="{1D7C051E-00E3-4D2C-8673-5182B215703C}"/>
+              </a:ext>
+            </a:extLst>
+          </p:cNvPr>
+          <p:cNvPicPr>
+            <a:picLocks noChangeAspect="1"/>
+          </p:cNvPicPr>
+          <p:nvPr/>
+        </p:nvPicPr>
+        <p:blipFill>
+          <a:blip r:embed="rId2">
+            <a:extLst>
+              <a:ext uri="{28A0092B-C50C-407E-A947-70E740481C1C}">
+                <a14:useLocalDpi xmlns:a14="http://schemas.microsoft.com/office/drawing/2010/main" val="0"/>
+              </a:ext>
+              <a:ext uri="{837473B0-CC2E-450A-ABE3-18F120FF3D39}">
+                <a1611:picAttrSrcUrl xmlns:a1611="http://schemas.microsoft.com/office/drawing/2016/11/main" r:id="rId3"/>
+              </a:ext>
+            </a:extLst>
+          </a:blip>
+          <a:stretch>
+            <a:fillRect/>
+          </a:stretch>
+        </p:blipFill>
+        <p:spPr>
+          <a:xfrm>
+            <a:off x="4790995" y="1579500"/>
+            <a:ext cx="311707" cy="311707"/>
+          </a:xfrm>
+          <a:prstGeom prst="rect">
+            <a:avLst/>
+          </a:prstGeom>
+        </p:spPr>
+      </p:pic>
+      <p:sp>
+        <p:nvSpPr>
+          <p:cNvPr id="49" name="Flowchart: Card 48">
+            <a:extLst>
+              <a:ext uri="{FF2B5EF4-FFF2-40B4-BE49-F238E27FC236}">
+                <a16:creationId xmlns:a16="http://schemas.microsoft.com/office/drawing/2014/main" id="{92C9B7E2-A68E-4498-8A4F-C2C2A9574543}"/>
+              </a:ext>
+            </a:extLst>
+          </p:cNvPr>
+          <p:cNvSpPr/>
+          <p:nvPr/>
+        </p:nvSpPr>
+        <p:spPr>
+          <a:xfrm>
+            <a:off x="5851817" y="2327892"/>
+            <a:ext cx="1425198" cy="351340"/>
+          </a:xfrm>
+          <a:prstGeom prst="flowChartPunchedCard">
+            <a:avLst/>
+          </a:prstGeom>
+        </p:spPr>
+        <p:style>
+          <a:lnRef idx="2">
+            <a:schemeClr val="accent1">
+              <a:shade val="50000"/>
+            </a:schemeClr>
+          </a:lnRef>
+          <a:fillRef idx="1">
+            <a:schemeClr val="accent1"/>
+          </a:fillRef>
+          <a:effectRef idx="0">
+            <a:schemeClr val="accent1"/>
+          </a:effectRef>
+          <a:fontRef idx="minor">
+            <a:schemeClr val="lt1"/>
+          </a:fontRef>
+        </p:style>
+        <p:txBody>
+          <a:bodyPr rtlCol="0" anchor="ctr"/>
+          <a:lstStyle/>
+          <a:p>
+            <a:pPr algn="ctr"/>
+            <a:r>
+              <a:rPr lang="en-US" sz="1200" dirty="0"/>
+              <a:t>output\object.html</a:t>
+            </a:r>
+          </a:p>
+        </p:txBody>
+      </p:sp>
+      <p:cxnSp>
+        <p:nvCxnSpPr>
+          <p:cNvPr id="51" name="Connector: Elbow 50">
+            <a:extLst>
+              <a:ext uri="{FF2B5EF4-FFF2-40B4-BE49-F238E27FC236}">
+                <a16:creationId xmlns:a16="http://schemas.microsoft.com/office/drawing/2014/main" id="{D03A2E9D-AEC7-4181-AA88-7E84197EF8BA}"/>
+              </a:ext>
+            </a:extLst>
+          </p:cNvPr>
+          <p:cNvCxnSpPr>
+            <a:cxnSpLocks/>
+            <a:stCxn id="39" idx="2"/>
+            <a:endCxn id="49" idx="1"/>
+          </p:cNvCxnSpPr>
+          <p:nvPr/>
+        </p:nvCxnSpPr>
+        <p:spPr>
+          <a:xfrm rot="16200000" flipH="1">
+            <a:off x="5479748" y="2131493"/>
+            <a:ext cx="416868" cy="327270"/>
+          </a:xfrm>
+          <a:prstGeom prst="bentConnector2">
+            <a:avLst/>
+          </a:prstGeom>
+          <a:ln>
+            <a:tailEnd type="triangle"/>
+          </a:ln>
+        </p:spPr>
+        <p:style>
+          <a:lnRef idx="1">
+            <a:schemeClr val="accent1"/>
+          </a:lnRef>
+          <a:fillRef idx="0">
+            <a:schemeClr val="accent1"/>
+          </a:fillRef>
+          <a:effectRef idx="0">
+            <a:schemeClr val="accent1"/>
+          </a:effectRef>
+          <a:fontRef idx="minor">
+            <a:schemeClr val="tx1"/>
+          </a:fontRef>
+        </p:style>
+      </p:cxnSp>
+      <p:sp>
+        <p:nvSpPr>
+          <p:cNvPr id="54" name="Flowchart: Card 53">
+            <a:extLst>
+              <a:ext uri="{FF2B5EF4-FFF2-40B4-BE49-F238E27FC236}">
+                <a16:creationId xmlns:a16="http://schemas.microsoft.com/office/drawing/2014/main" id="{3B13AB81-5CBF-4330-A3F1-24253E736B5E}"/>
+              </a:ext>
+            </a:extLst>
+          </p:cNvPr>
+          <p:cNvSpPr/>
+          <p:nvPr/>
+        </p:nvSpPr>
+        <p:spPr>
+          <a:xfrm>
+            <a:off x="7773954" y="1714671"/>
+            <a:ext cx="2793404" cy="351340"/>
+          </a:xfrm>
+          <a:prstGeom prst="flowChartPunchedCard">
+            <a:avLst/>
+          </a:prstGeom>
+        </p:spPr>
+        <p:style>
+          <a:lnRef idx="2">
+            <a:schemeClr val="accent1">
+              <a:shade val="50000"/>
+            </a:schemeClr>
+          </a:lnRef>
+          <a:fillRef idx="1">
+            <a:schemeClr val="accent1"/>
+          </a:fillRef>
+          <a:effectRef idx="0">
+            <a:schemeClr val="accent1"/>
+          </a:effectRef>
+          <a:fontRef idx="minor">
+            <a:schemeClr val="lt1"/>
+          </a:fontRef>
+        </p:style>
+        <p:txBody>
+          <a:bodyPr rtlCol="0" anchor="ctr"/>
+          <a:lstStyle/>
+          <a:p>
+            <a:pPr algn="ctr"/>
+            <a:r>
+              <a:rPr lang="en-US" sz="1200" dirty="0"/>
+              <a:t>output\</a:t>
+            </a:r>
+            <a:r>
+              <a:rPr lang="en-US" sz="1200" dirty="0" err="1"/>
+              <a:t>css</a:t>
+            </a:r>
+            <a:r>
+              <a:rPr lang="en-US" sz="1200" dirty="0"/>
+              <a:t>\joint, bootstrap, custom.css</a:t>
+            </a:r>
+          </a:p>
+        </p:txBody>
+      </p:sp>
+      <p:sp>
+        <p:nvSpPr>
+          <p:cNvPr id="55" name="Flowchart: Card 54">
+            <a:extLst>
+              <a:ext uri="{FF2B5EF4-FFF2-40B4-BE49-F238E27FC236}">
+                <a16:creationId xmlns:a16="http://schemas.microsoft.com/office/drawing/2014/main" id="{08E8E6D3-24D9-470D-9C4D-8329832FA262}"/>
+              </a:ext>
+            </a:extLst>
+          </p:cNvPr>
+          <p:cNvSpPr/>
+          <p:nvPr/>
+        </p:nvSpPr>
+        <p:spPr>
+          <a:xfrm>
+            <a:off x="7773954" y="2165961"/>
+            <a:ext cx="2793404" cy="351340"/>
+          </a:xfrm>
+          <a:prstGeom prst="flowChartPunchedCard">
+            <a:avLst/>
+          </a:prstGeom>
+        </p:spPr>
+        <p:style>
+          <a:lnRef idx="2">
+            <a:schemeClr val="accent1">
+              <a:shade val="50000"/>
+            </a:schemeClr>
+          </a:lnRef>
+          <a:fillRef idx="1">
+            <a:schemeClr val="accent1"/>
+          </a:fillRef>
+          <a:effectRef idx="0">
+            <a:schemeClr val="accent1"/>
+          </a:effectRef>
+          <a:fontRef idx="minor">
+            <a:schemeClr val="lt1"/>
+          </a:fontRef>
+        </p:style>
+        <p:txBody>
+          <a:bodyPr rtlCol="0" anchor="ctr"/>
+          <a:lstStyle/>
+          <a:p>
+            <a:pPr algn="ctr"/>
+            <a:r>
+              <a:rPr lang="en-US" sz="1200" dirty="0"/>
+              <a:t>output\</a:t>
+            </a:r>
+            <a:r>
+              <a:rPr lang="en-US" sz="1200" dirty="0" err="1"/>
+              <a:t>js</a:t>
+            </a:r>
+            <a:r>
+              <a:rPr lang="en-US" sz="1200" dirty="0"/>
+              <a:t>\require, </a:t>
+            </a:r>
+            <a:r>
+              <a:rPr lang="en-US" sz="1200" dirty="0" err="1"/>
+              <a:t>jquery</a:t>
+            </a:r>
+            <a:r>
+              <a:rPr lang="en-US" sz="1200" dirty="0"/>
+              <a:t>, bootstrap, init.js</a:t>
+            </a:r>
+          </a:p>
+        </p:txBody>
+      </p:sp>
+      <p:sp>
+        <p:nvSpPr>
+          <p:cNvPr id="56" name="Flowchart: Card 55">
+            <a:extLst>
+              <a:ext uri="{FF2B5EF4-FFF2-40B4-BE49-F238E27FC236}">
+                <a16:creationId xmlns:a16="http://schemas.microsoft.com/office/drawing/2014/main" id="{3BD500C6-A2AE-4C9D-938D-CE9F78C23E03}"/>
+              </a:ext>
+            </a:extLst>
+          </p:cNvPr>
+          <p:cNvSpPr/>
+          <p:nvPr/>
+        </p:nvSpPr>
+        <p:spPr>
+          <a:xfrm>
+            <a:off x="9454550" y="2789373"/>
+            <a:ext cx="1727839" cy="351340"/>
+          </a:xfrm>
+          <a:prstGeom prst="flowChartPunchedCard">
+            <a:avLst/>
+          </a:prstGeom>
+        </p:spPr>
+        <p:style>
+          <a:lnRef idx="2">
+            <a:schemeClr val="accent1">
+              <a:shade val="50000"/>
+            </a:schemeClr>
+          </a:lnRef>
+          <a:fillRef idx="1">
+            <a:schemeClr val="accent1"/>
+          </a:fillRef>
+          <a:effectRef idx="0">
+            <a:schemeClr val="accent1"/>
+          </a:effectRef>
+          <a:fontRef idx="minor">
+            <a:schemeClr val="lt1"/>
+          </a:fontRef>
+        </p:style>
+        <p:txBody>
+          <a:bodyPr rtlCol="0" anchor="ctr"/>
+          <a:lstStyle/>
+          <a:p>
+            <a:pPr algn="ctr"/>
+            <a:r>
+              <a:rPr lang="en-US" sz="1200" dirty="0"/>
+              <a:t>init.js: dependencies JS</a:t>
+            </a:r>
+          </a:p>
+        </p:txBody>
+      </p:sp>
+      <p:cxnSp>
+        <p:nvCxnSpPr>
+          <p:cNvPr id="58" name="Connector: Elbow 57">
+            <a:extLst>
+              <a:ext uri="{FF2B5EF4-FFF2-40B4-BE49-F238E27FC236}">
+                <a16:creationId xmlns:a16="http://schemas.microsoft.com/office/drawing/2014/main" id="{13D6B0B8-7E82-41C5-BE84-EB270BAC30B0}"/>
+              </a:ext>
+            </a:extLst>
+          </p:cNvPr>
+          <p:cNvCxnSpPr>
+            <a:stCxn id="55" idx="2"/>
+            <a:endCxn id="56" idx="0"/>
+          </p:cNvCxnSpPr>
+          <p:nvPr/>
+        </p:nvCxnSpPr>
+        <p:spPr>
+          <a:xfrm rot="16200000" flipH="1">
+            <a:off x="9608527" y="2079430"/>
+            <a:ext cx="272072" cy="1147814"/>
+          </a:xfrm>
+          <a:prstGeom prst="bentConnector3">
+            <a:avLst/>
+          </a:prstGeom>
+          <a:ln>
+            <a:tailEnd type="triangle"/>
+          </a:ln>
+        </p:spPr>
+        <p:style>
+          <a:lnRef idx="1">
+            <a:schemeClr val="accent1"/>
+          </a:lnRef>
+          <a:fillRef idx="0">
+            <a:schemeClr val="accent1"/>
+          </a:fillRef>
+          <a:effectRef idx="0">
+            <a:schemeClr val="accent1"/>
+          </a:effectRef>
+          <a:fontRef idx="minor">
+            <a:schemeClr val="tx1"/>
+          </a:fontRef>
+        </p:style>
+      </p:cxnSp>
+      <p:cxnSp>
+        <p:nvCxnSpPr>
+          <p:cNvPr id="60" name="Connector: Elbow 59">
+            <a:extLst>
+              <a:ext uri="{FF2B5EF4-FFF2-40B4-BE49-F238E27FC236}">
+                <a16:creationId xmlns:a16="http://schemas.microsoft.com/office/drawing/2014/main" id="{89ED6CE1-8561-49CE-8E60-A4D69A0EC550}"/>
+              </a:ext>
+            </a:extLst>
+          </p:cNvPr>
+          <p:cNvCxnSpPr>
+            <a:stCxn id="49" idx="3"/>
+            <a:endCxn id="54" idx="1"/>
+          </p:cNvCxnSpPr>
+          <p:nvPr/>
+        </p:nvCxnSpPr>
+        <p:spPr>
+          <a:xfrm flipV="1">
+            <a:off x="7277015" y="1890341"/>
+            <a:ext cx="496939" cy="613221"/>
+          </a:xfrm>
+          <a:prstGeom prst="bentConnector3">
+            <a:avLst/>
+          </a:prstGeom>
+          <a:ln>
+            <a:tailEnd type="triangle"/>
+          </a:ln>
+        </p:spPr>
+        <p:style>
+          <a:lnRef idx="1">
+            <a:schemeClr val="accent1"/>
+          </a:lnRef>
+          <a:fillRef idx="0">
+            <a:schemeClr val="accent1"/>
+          </a:fillRef>
+          <a:effectRef idx="0">
+            <a:schemeClr val="accent1"/>
+          </a:effectRef>
+          <a:fontRef idx="minor">
+            <a:schemeClr val="tx1"/>
+          </a:fontRef>
+        </p:style>
+      </p:cxnSp>
+      <p:cxnSp>
+        <p:nvCxnSpPr>
+          <p:cNvPr id="62" name="Connector: Elbow 61">
+            <a:extLst>
+              <a:ext uri="{FF2B5EF4-FFF2-40B4-BE49-F238E27FC236}">
+                <a16:creationId xmlns:a16="http://schemas.microsoft.com/office/drawing/2014/main" id="{FDC588FC-FB0D-4175-BF58-0B674254A586}"/>
+              </a:ext>
+            </a:extLst>
+          </p:cNvPr>
+          <p:cNvCxnSpPr>
+            <a:stCxn id="49" idx="3"/>
+            <a:endCxn id="55" idx="1"/>
+          </p:cNvCxnSpPr>
+          <p:nvPr/>
+        </p:nvCxnSpPr>
+        <p:spPr>
+          <a:xfrm flipV="1">
+            <a:off x="7277015" y="2341631"/>
+            <a:ext cx="496939" cy="161931"/>
+          </a:xfrm>
+          <a:prstGeom prst="bentConnector3">
+            <a:avLst/>
+          </a:prstGeom>
+          <a:ln>
+            <a:tailEnd type="triangle"/>
+          </a:ln>
+        </p:spPr>
+        <p:style>
+          <a:lnRef idx="1">
+            <a:schemeClr val="accent1"/>
+          </a:lnRef>
+          <a:fillRef idx="0">
+            <a:schemeClr val="accent1"/>
+          </a:fillRef>
+          <a:effectRef idx="0">
+            <a:schemeClr val="accent1"/>
+          </a:effectRef>
+          <a:fontRef idx="minor">
+            <a:schemeClr val="tx1"/>
+          </a:fontRef>
+        </p:style>
+      </p:cxnSp>
+      <p:sp>
+        <p:nvSpPr>
+          <p:cNvPr id="70" name="Flowchart: Card 69">
+            <a:extLst>
+              <a:ext uri="{FF2B5EF4-FFF2-40B4-BE49-F238E27FC236}">
+                <a16:creationId xmlns:a16="http://schemas.microsoft.com/office/drawing/2014/main" id="{C0260AE8-AB39-4FE1-A925-48C18052EE04}"/>
+              </a:ext>
+            </a:extLst>
+          </p:cNvPr>
+          <p:cNvSpPr/>
+          <p:nvPr/>
+        </p:nvSpPr>
+        <p:spPr>
+          <a:xfrm>
+            <a:off x="9880471" y="3466707"/>
+            <a:ext cx="1727839" cy="289698"/>
+          </a:xfrm>
+          <a:prstGeom prst="flowChartPunchedCard">
+            <a:avLst/>
+          </a:prstGeom>
+        </p:spPr>
+        <p:style>
+          <a:lnRef idx="2">
+            <a:schemeClr val="accent1">
+              <a:shade val="50000"/>
+            </a:schemeClr>
+          </a:lnRef>
+          <a:fillRef idx="1">
+            <a:schemeClr val="accent1"/>
+          </a:fillRef>
+          <a:effectRef idx="0">
+            <a:schemeClr val="accent1"/>
+          </a:effectRef>
+          <a:fontRef idx="minor">
+            <a:schemeClr val="lt1"/>
+          </a:fontRef>
+        </p:style>
+        <p:txBody>
+          <a:bodyPr rtlCol="0" anchor="ctr"/>
+          <a:lstStyle/>
+          <a:p>
+            <a:pPr algn="ctr"/>
+            <a:r>
+              <a:rPr lang="en-US" sz="1200" dirty="0"/>
+              <a:t>boot.js</a:t>
+            </a:r>
+          </a:p>
+        </p:txBody>
+      </p:sp>
+      <p:cxnSp>
+        <p:nvCxnSpPr>
+          <p:cNvPr id="72" name="Connector: Elbow 71">
+            <a:extLst>
+              <a:ext uri="{FF2B5EF4-FFF2-40B4-BE49-F238E27FC236}">
+                <a16:creationId xmlns:a16="http://schemas.microsoft.com/office/drawing/2014/main" id="{BA877F74-7059-4618-BBE1-4884A8060799}"/>
+              </a:ext>
+            </a:extLst>
+          </p:cNvPr>
+          <p:cNvCxnSpPr>
+            <a:cxnSpLocks/>
+            <a:stCxn id="56" idx="2"/>
+            <a:endCxn id="70" idx="0"/>
+          </p:cNvCxnSpPr>
+          <p:nvPr/>
+        </p:nvCxnSpPr>
+        <p:spPr>
+          <a:xfrm rot="16200000" flipH="1">
+            <a:off x="10368433" y="3090749"/>
+            <a:ext cx="325994" cy="425921"/>
+          </a:xfrm>
+          <a:prstGeom prst="bentConnector3">
+            <a:avLst>
+              <a:gd name="adj1" fmla="val 50000"/>
+            </a:avLst>
+          </a:prstGeom>
+          <a:ln>
+            <a:tailEnd type="triangle"/>
+          </a:ln>
+        </p:spPr>
+        <p:style>
+          <a:lnRef idx="1">
+            <a:schemeClr val="accent1"/>
+          </a:lnRef>
+          <a:fillRef idx="0">
+            <a:schemeClr val="accent1"/>
+          </a:fillRef>
+          <a:effectRef idx="0">
+            <a:schemeClr val="accent1"/>
+          </a:effectRef>
+          <a:fontRef idx="minor">
+            <a:schemeClr val="tx1"/>
+          </a:fontRef>
+        </p:style>
+      </p:cxnSp>
+      <p:sp>
+        <p:nvSpPr>
+          <p:cNvPr id="76" name="Flowchart: Card 75">
+            <a:extLst>
+              <a:ext uri="{FF2B5EF4-FFF2-40B4-BE49-F238E27FC236}">
+                <a16:creationId xmlns:a16="http://schemas.microsoft.com/office/drawing/2014/main" id="{60C19F30-BF82-4FC6-A75A-90E2204DFEA1}"/>
+              </a:ext>
+            </a:extLst>
+          </p:cNvPr>
+          <p:cNvSpPr/>
+          <p:nvPr/>
+        </p:nvSpPr>
+        <p:spPr>
+          <a:xfrm>
+            <a:off x="7277014" y="3634981"/>
+            <a:ext cx="2030887" cy="783969"/>
+          </a:xfrm>
+          <a:prstGeom prst="flowChartPunchedCard">
+            <a:avLst/>
+          </a:prstGeom>
+        </p:spPr>
+        <p:style>
+          <a:lnRef idx="2">
+            <a:schemeClr val="accent1">
+              <a:shade val="50000"/>
+            </a:schemeClr>
+          </a:lnRef>
+          <a:fillRef idx="1">
+            <a:schemeClr val="accent1"/>
+          </a:fillRef>
+          <a:effectRef idx="0">
+            <a:schemeClr val="accent1"/>
+          </a:effectRef>
+          <a:fontRef idx="minor">
+            <a:schemeClr val="lt1"/>
+          </a:fontRef>
+        </p:style>
+        <p:txBody>
+          <a:bodyPr rtlCol="0" anchor="ctr"/>
+          <a:lstStyle/>
+          <a:p>
+            <a:pPr algn="ctr"/>
+            <a:r>
+              <a:rPr lang="en-US" sz="1200" dirty="0"/>
+              <a:t>views/tilda_schema_view.js</a:t>
+            </a:r>
+          </a:p>
+          <a:p>
+            <a:pPr algn="ctr"/>
+            <a:r>
+              <a:rPr lang="en-US" sz="1200" dirty="0"/>
+              <a:t>render()</a:t>
+            </a:r>
+          </a:p>
+          <a:p>
+            <a:pPr algn="ctr"/>
+            <a:r>
+              <a:rPr lang="en-US" sz="1200" dirty="0"/>
+              <a:t>events {…}</a:t>
+            </a:r>
+          </a:p>
+        </p:txBody>
+      </p:sp>
+      <p:cxnSp>
+        <p:nvCxnSpPr>
+          <p:cNvPr id="78" name="Connector: Elbow 77">
+            <a:extLst>
+              <a:ext uri="{FF2B5EF4-FFF2-40B4-BE49-F238E27FC236}">
+                <a16:creationId xmlns:a16="http://schemas.microsoft.com/office/drawing/2014/main" id="{123B04B8-A209-4BBB-A318-6784BF8DD882}"/>
+              </a:ext>
+            </a:extLst>
+          </p:cNvPr>
+          <p:cNvCxnSpPr>
+            <a:cxnSpLocks/>
+            <a:stCxn id="70" idx="1"/>
+            <a:endCxn id="76" idx="3"/>
+          </p:cNvCxnSpPr>
+          <p:nvPr/>
+        </p:nvCxnSpPr>
+        <p:spPr>
+          <a:xfrm rot="10800000" flipV="1">
+            <a:off x="9307901" y="3611556"/>
+            <a:ext cx="572570" cy="415410"/>
+          </a:xfrm>
+          <a:prstGeom prst="bentConnector3">
+            <a:avLst>
+              <a:gd name="adj1" fmla="val 50000"/>
+            </a:avLst>
+          </a:prstGeom>
+          <a:ln>
+            <a:tailEnd type="triangle"/>
+          </a:ln>
+        </p:spPr>
+        <p:style>
+          <a:lnRef idx="1">
+            <a:schemeClr val="accent1"/>
+          </a:lnRef>
+          <a:fillRef idx="0">
+            <a:schemeClr val="accent1"/>
+          </a:fillRef>
+          <a:effectRef idx="0">
+            <a:schemeClr val="accent1"/>
+          </a:effectRef>
+          <a:fontRef idx="minor">
+            <a:schemeClr val="tx1"/>
+          </a:fontRef>
+        </p:style>
+      </p:cxnSp>
+      <p:sp>
+        <p:nvSpPr>
+          <p:cNvPr id="95" name="Flowchart: Card 94">
+            <a:extLst>
+              <a:ext uri="{FF2B5EF4-FFF2-40B4-BE49-F238E27FC236}">
+                <a16:creationId xmlns:a16="http://schemas.microsoft.com/office/drawing/2014/main" id="{F59034A5-086B-4D4E-A4F7-7687282F8331}"/>
+              </a:ext>
+            </a:extLst>
+          </p:cNvPr>
+          <p:cNvSpPr/>
+          <p:nvPr/>
+        </p:nvSpPr>
+        <p:spPr>
+          <a:xfrm>
+            <a:off x="10453041" y="4178767"/>
+            <a:ext cx="1301918" cy="1229995"/>
+          </a:xfrm>
+          <a:prstGeom prst="flowChartPunchedCard">
+            <a:avLst/>
+          </a:prstGeom>
+        </p:spPr>
+        <p:style>
+          <a:lnRef idx="0">
+            <a:schemeClr val="accent4"/>
+          </a:lnRef>
+          <a:fillRef idx="3">
+            <a:schemeClr val="accent4"/>
+          </a:fillRef>
+          <a:effectRef idx="3">
+            <a:schemeClr val="accent4"/>
+          </a:effectRef>
+          <a:fontRef idx="minor">
+            <a:schemeClr val="lt1"/>
+          </a:fontRef>
+        </p:style>
+        <p:txBody>
+          <a:bodyPr rtlCol="0" anchor="ctr"/>
+          <a:lstStyle/>
+          <a:p>
+            <a:pPr algn="ctr"/>
+            <a:r>
+              <a:rPr lang="en-US" dirty="0"/>
+              <a:t>&lt;BODY&gt;</a:t>
+            </a:r>
+          </a:p>
+          <a:p>
+            <a:pPr algn="ctr"/>
+            <a:r>
+              <a:rPr lang="en-US" dirty="0"/>
+              <a:t>&lt;/BODY&gt;</a:t>
+            </a:r>
+          </a:p>
+        </p:txBody>
+      </p:sp>
+      <p:cxnSp>
+        <p:nvCxnSpPr>
+          <p:cNvPr id="97" name="Connector: Elbow 96">
+            <a:extLst>
+              <a:ext uri="{FF2B5EF4-FFF2-40B4-BE49-F238E27FC236}">
+                <a16:creationId xmlns:a16="http://schemas.microsoft.com/office/drawing/2014/main" id="{B1294926-33AD-4D95-BF20-06B844759A04}"/>
+              </a:ext>
+            </a:extLst>
+          </p:cNvPr>
+          <p:cNvCxnSpPr>
+            <a:cxnSpLocks/>
+            <a:stCxn id="70" idx="2"/>
+            <a:endCxn id="95" idx="0"/>
+          </p:cNvCxnSpPr>
+          <p:nvPr/>
+        </p:nvCxnSpPr>
+        <p:spPr>
+          <a:xfrm rot="16200000" flipH="1">
+            <a:off x="10713014" y="3787781"/>
+            <a:ext cx="422362" cy="359609"/>
+          </a:xfrm>
+          <a:prstGeom prst="bentConnector3">
+            <a:avLst/>
+          </a:prstGeom>
+          <a:ln>
+            <a:tailEnd type="triangle"/>
+          </a:ln>
+        </p:spPr>
+        <p:style>
+          <a:lnRef idx="1">
+            <a:schemeClr val="accent1"/>
+          </a:lnRef>
+          <a:fillRef idx="0">
+            <a:schemeClr val="accent1"/>
+          </a:fillRef>
+          <a:effectRef idx="0">
+            <a:schemeClr val="accent1"/>
+          </a:effectRef>
+          <a:fontRef idx="minor">
+            <a:schemeClr val="tx1"/>
+          </a:fontRef>
+        </p:style>
+      </p:cxnSp>
+      <p:sp>
+        <p:nvSpPr>
+          <p:cNvPr id="100" name="Flowchart: Card 99">
+            <a:extLst>
+              <a:ext uri="{FF2B5EF4-FFF2-40B4-BE49-F238E27FC236}">
+                <a16:creationId xmlns:a16="http://schemas.microsoft.com/office/drawing/2014/main" id="{566A4E3B-1F87-4A4D-9B55-123863650061}"/>
+              </a:ext>
+            </a:extLst>
+          </p:cNvPr>
+          <p:cNvSpPr/>
+          <p:nvPr/>
+        </p:nvSpPr>
+        <p:spPr>
+          <a:xfrm>
+            <a:off x="7065169" y="4837866"/>
+            <a:ext cx="2737377" cy="289698"/>
+          </a:xfrm>
+          <a:prstGeom prst="flowChartPunchedCard">
+            <a:avLst/>
+          </a:prstGeom>
+        </p:spPr>
+        <p:style>
+          <a:lnRef idx="2">
+            <a:schemeClr val="accent1">
+              <a:shade val="50000"/>
+            </a:schemeClr>
+          </a:lnRef>
+          <a:fillRef idx="1">
+            <a:schemeClr val="accent1"/>
+          </a:fillRef>
+          <a:effectRef idx="0">
+            <a:schemeClr val="accent1"/>
+          </a:effectRef>
+          <a:fontRef idx="minor">
+            <a:schemeClr val="lt1"/>
+          </a:fontRef>
+        </p:style>
+        <p:txBody>
+          <a:bodyPr rtlCol="0" anchor="ctr"/>
+          <a:lstStyle/>
+          <a:p>
+            <a:pPr algn="ctr"/>
+            <a:r>
+              <a:rPr lang="en-US" sz="1200" dirty="0"/>
+              <a:t>templates/</a:t>
+            </a:r>
+            <a:r>
+              <a:rPr lang="en-US" sz="1200" dirty="0" err="1"/>
+              <a:t>tilda_schema</a:t>
+            </a:r>
+            <a:r>
+              <a:rPr lang="en-US" sz="1200" dirty="0"/>
+              <a:t>/_new.html</a:t>
+            </a:r>
+          </a:p>
+        </p:txBody>
+      </p:sp>
+      <p:cxnSp>
+        <p:nvCxnSpPr>
+          <p:cNvPr id="102" name="Connector: Elbow 101">
+            <a:extLst>
+              <a:ext uri="{FF2B5EF4-FFF2-40B4-BE49-F238E27FC236}">
+                <a16:creationId xmlns:a16="http://schemas.microsoft.com/office/drawing/2014/main" id="{ACEEB88F-EC37-482D-801F-E3DDFB6C89E4}"/>
+              </a:ext>
+            </a:extLst>
+          </p:cNvPr>
+          <p:cNvCxnSpPr>
+            <a:stCxn id="76" idx="2"/>
+            <a:endCxn id="100" idx="0"/>
+          </p:cNvCxnSpPr>
+          <p:nvPr/>
+        </p:nvCxnSpPr>
+        <p:spPr>
+          <a:xfrm rot="16200000" flipH="1">
+            <a:off x="8153700" y="4557708"/>
+            <a:ext cx="418916" cy="141400"/>
+          </a:xfrm>
+          <a:prstGeom prst="bentConnector3">
+            <a:avLst/>
+          </a:prstGeom>
+          <a:ln>
+            <a:tailEnd type="triangle"/>
+          </a:ln>
+        </p:spPr>
+        <p:style>
+          <a:lnRef idx="1">
+            <a:schemeClr val="accent1"/>
+          </a:lnRef>
+          <a:fillRef idx="0">
+            <a:schemeClr val="accent1"/>
+          </a:fillRef>
+          <a:effectRef idx="0">
+            <a:schemeClr val="accent1"/>
+          </a:effectRef>
+          <a:fontRef idx="minor">
+            <a:schemeClr val="tx1"/>
+          </a:fontRef>
+        </p:style>
+      </p:cxnSp>
+      <p:cxnSp>
+        <p:nvCxnSpPr>
+          <p:cNvPr id="105" name="Connector: Elbow 104">
+            <a:extLst>
+              <a:ext uri="{FF2B5EF4-FFF2-40B4-BE49-F238E27FC236}">
+                <a16:creationId xmlns:a16="http://schemas.microsoft.com/office/drawing/2014/main" id="{4A6B1930-3448-4623-BAF2-F8E129BDAF62}"/>
+              </a:ext>
+            </a:extLst>
+          </p:cNvPr>
+          <p:cNvCxnSpPr>
+            <a:stCxn id="100" idx="3"/>
+            <a:endCxn id="95" idx="1"/>
+          </p:cNvCxnSpPr>
+          <p:nvPr/>
+        </p:nvCxnSpPr>
+        <p:spPr>
+          <a:xfrm flipV="1">
+            <a:off x="9802546" y="4793765"/>
+            <a:ext cx="650495" cy="188950"/>
+          </a:xfrm>
+          <a:prstGeom prst="bentConnector3">
+            <a:avLst/>
+          </a:prstGeom>
+          <a:ln>
+            <a:tailEnd type="triangle"/>
+          </a:ln>
+        </p:spPr>
+        <p:style>
+          <a:lnRef idx="1">
+            <a:schemeClr val="accent1"/>
+          </a:lnRef>
+          <a:fillRef idx="0">
+            <a:schemeClr val="accent1"/>
+          </a:fillRef>
+          <a:effectRef idx="0">
+            <a:schemeClr val="accent1"/>
+          </a:effectRef>
+          <a:fontRef idx="minor">
+            <a:schemeClr val="tx1"/>
+          </a:fontRef>
+        </p:style>
+      </p:cxnSp>
+    </p:spTree>
+    <p:extLst>
+      <p:ext uri="{BB962C8B-B14F-4D97-AF65-F5344CB8AC3E}">
+        <p14:creationId xmlns:p14="http://schemas.microsoft.com/office/powerpoint/2010/main" val="1676348998"/>
       </p:ext>
     </p:extLst>
   </p:cSld>

</xml_diff>

<commit_message>
#262 allow json comments in tilda definition files
Also, added new LineCount utility, and misc updates, and docs
</commit_message>
<xml_diff>
--- a/Tilda Tooling Architcture.pptx
+++ b/Tilda Tooling Architcture.pptx
@@ -5,7 +5,7 @@
     <p:sldMasterId id="2147483672" r:id="rId1"/>
   </p:sldMasterIdLst>
   <p:notesMasterIdLst>
-    <p:notesMasterId r:id="rId8"/>
+    <p:notesMasterId r:id="rId9"/>
   </p:notesMasterIdLst>
   <p:sldIdLst>
     <p:sldId id="256" r:id="rId2"/>
@@ -14,6 +14,7 @@
     <p:sldId id="258" r:id="rId5"/>
     <p:sldId id="259" r:id="rId6"/>
     <p:sldId id="261" r:id="rId7"/>
+    <p:sldId id="262" r:id="rId8"/>
   </p:sldIdLst>
   <p:sldSz cx="12192000" cy="6858000"/>
   <p:notesSz cx="6858000" cy="9144000"/>
@@ -202,7 +203,7 @@
           <a:p>
             <a:fld id="{74B032DE-BBB5-4125-9035-45E6835D9734}" type="datetimeFigureOut">
               <a:rPr lang="en-US" smtClean="0"/>
-              <a:t>2018-08-30</a:t>
+              <a:t>2018-09-04</a:t>
             </a:fld>
             <a:endParaRPr lang="en-US"/>
           </a:p>
@@ -23729,6 +23730,271 @@
 </p:sld>
 </file>
 
+<file path=ppt/slides/slide7.xml><?xml version="1.0" encoding="utf-8"?>
+<p:sld xmlns:a="http://schemas.openxmlformats.org/drawingml/2006/main" xmlns:r="http://schemas.openxmlformats.org/officeDocument/2006/relationships" xmlns:p="http://schemas.openxmlformats.org/presentationml/2006/main">
+  <p:cSld>
+    <p:spTree>
+      <p:nvGrpSpPr>
+        <p:cNvPr id="1" name=""/>
+        <p:cNvGrpSpPr/>
+        <p:nvPr/>
+      </p:nvGrpSpPr>
+      <p:grpSpPr>
+        <a:xfrm>
+          <a:off x="0" y="0"/>
+          <a:ext cx="0" cy="0"/>
+          <a:chOff x="0" y="0"/>
+          <a:chExt cx="0" cy="0"/>
+        </a:xfrm>
+      </p:grpSpPr>
+      <p:sp>
+        <p:nvSpPr>
+          <p:cNvPr id="2" name="Title 1">
+            <a:extLst>
+              <a:ext uri="{FF2B5EF4-FFF2-40B4-BE49-F238E27FC236}">
+                <a16:creationId xmlns:a16="http://schemas.microsoft.com/office/drawing/2014/main" id="{32100474-E1E0-4A90-9EEA-12DCC114C0C0}"/>
+              </a:ext>
+            </a:extLst>
+          </p:cNvPr>
+          <p:cNvSpPr>
+            <a:spLocks noGrp="1"/>
+          </p:cNvSpPr>
+          <p:nvPr>
+            <p:ph type="title"/>
+          </p:nvPr>
+        </p:nvSpPr>
+        <p:spPr/>
+        <p:txBody>
+          <a:bodyPr>
+            <a:normAutofit fontScale="90000"/>
+          </a:bodyPr>
+          <a:lstStyle/>
+          <a:p>
+            <a:r>
+              <a:rPr lang="en-US" dirty="0"/>
+              <a:t>File-based interactions</a:t>
+            </a:r>
+          </a:p>
+        </p:txBody>
+      </p:sp>
+      <p:sp>
+        <p:nvSpPr>
+          <p:cNvPr id="3" name="Content Placeholder 2">
+            <a:extLst>
+              <a:ext uri="{FF2B5EF4-FFF2-40B4-BE49-F238E27FC236}">
+                <a16:creationId xmlns:a16="http://schemas.microsoft.com/office/drawing/2014/main" id="{2CA4F6E5-E25B-45A3-8648-0C23EF1E5A0D}"/>
+              </a:ext>
+            </a:extLst>
+          </p:cNvPr>
+          <p:cNvSpPr>
+            <a:spLocks noGrp="1"/>
+          </p:cNvSpPr>
+          <p:nvPr>
+            <p:ph idx="1"/>
+          </p:nvPr>
+        </p:nvSpPr>
+        <p:spPr/>
+        <p:txBody>
+          <a:bodyPr/>
+          <a:lstStyle/>
+          <a:p>
+            <a:r>
+              <a:rPr lang="en-US" dirty="0"/>
+              <a:t>Click on the “Open Folder” button</a:t>
+            </a:r>
+          </a:p>
+          <a:p>
+            <a:pPr lvl="1"/>
+            <a:r>
+              <a:rPr lang="en-US" dirty="0"/>
+              <a:t>Invoke event handler </a:t>
+            </a:r>
+            <a:r>
+              <a:rPr lang="en-US" sz="2000" dirty="0"/>
+              <a:t>views/</a:t>
+            </a:r>
+            <a:r>
+              <a:rPr lang="en-US" sz="2000" dirty="0" err="1"/>
+              <a:t>tilda_schema_view.js:</a:t>
+            </a:r>
+            <a:r>
+              <a:rPr lang="en-US" dirty="0" err="1"/>
+              <a:t>handleFileInput</a:t>
+            </a:r>
+            <a:endParaRPr lang="en-US" dirty="0"/>
+          </a:p>
+          <a:p>
+            <a:pPr lvl="2"/>
+            <a:r>
+              <a:rPr lang="en-US" sz="1600" dirty="0"/>
+              <a:t>Invokes callback </a:t>
+            </a:r>
+            <a:r>
+              <a:rPr lang="en-US" sz="1200" dirty="0"/>
+              <a:t>views/</a:t>
+            </a:r>
+            <a:r>
+              <a:rPr lang="en-US" sz="1200" dirty="0" err="1"/>
+              <a:t>tilda_schema_view.js:</a:t>
+            </a:r>
+            <a:r>
+              <a:rPr lang="en-US" dirty="0" err="1"/>
+              <a:t>fileInputHandler</a:t>
+            </a:r>
+            <a:endParaRPr lang="en-US" dirty="0"/>
+          </a:p>
+          <a:p>
+            <a:pPr lvl="3"/>
+            <a:r>
+              <a:rPr lang="en-US" sz="1600" dirty="0"/>
+              <a:t>Invokes </a:t>
+            </a:r>
+            <a:r>
+              <a:rPr lang="en-US" dirty="0"/>
+              <a:t>core/</a:t>
+            </a:r>
+            <a:r>
+              <a:rPr lang="en-US" dirty="0" err="1"/>
+              <a:t>file_search.js:FileSearch</a:t>
+            </a:r>
+            <a:r>
+              <a:rPr lang="en-US" dirty="0"/>
+              <a:t>()</a:t>
+            </a:r>
+          </a:p>
+          <a:p>
+            <a:pPr lvl="3"/>
+            <a:r>
+              <a:rPr lang="en-US" sz="1600" dirty="0"/>
+              <a:t>Invokes core/</a:t>
+            </a:r>
+            <a:r>
+              <a:rPr lang="en-US" sz="1600" dirty="0" err="1"/>
+              <a:t>read_schema.js:X</a:t>
+            </a:r>
+            <a:r>
+              <a:rPr lang="en-US" sz="1600" dirty="0"/>
+              <a:t>()</a:t>
+            </a:r>
+          </a:p>
+          <a:p>
+            <a:r>
+              <a:rPr lang="en-US" sz="2400" dirty="0"/>
+              <a:t>Click on Schema in drop-down</a:t>
+            </a:r>
+          </a:p>
+          <a:p>
+            <a:pPr lvl="1"/>
+            <a:r>
+              <a:rPr lang="en-US" dirty="0"/>
+              <a:t>Invoke event handler views/</a:t>
+            </a:r>
+            <a:r>
+              <a:rPr lang="en-US" dirty="0" err="1"/>
+              <a:t>tilda_schema_view.js:changeView</a:t>
+            </a:r>
+            <a:endParaRPr lang="en-US" dirty="0"/>
+          </a:p>
+        </p:txBody>
+      </p:sp>
+      <p:sp>
+        <p:nvSpPr>
+          <p:cNvPr id="4" name="Date Placeholder 3">
+            <a:extLst>
+              <a:ext uri="{FF2B5EF4-FFF2-40B4-BE49-F238E27FC236}">
+                <a16:creationId xmlns:a16="http://schemas.microsoft.com/office/drawing/2014/main" id="{57BD9DD7-EFD7-425F-A2ED-7D739D469549}"/>
+              </a:ext>
+            </a:extLst>
+          </p:cNvPr>
+          <p:cNvSpPr>
+            <a:spLocks noGrp="1"/>
+          </p:cNvSpPr>
+          <p:nvPr>
+            <p:ph type="dt" sz="half" idx="10"/>
+          </p:nvPr>
+        </p:nvSpPr>
+        <p:spPr/>
+        <p:txBody>
+          <a:bodyPr/>
+          <a:lstStyle/>
+          <a:p>
+            <a:r>
+              <a:rPr lang="en-US"/>
+              <a:t>2018-08-27</a:t>
+            </a:r>
+          </a:p>
+        </p:txBody>
+      </p:sp>
+      <p:sp>
+        <p:nvSpPr>
+          <p:cNvPr id="5" name="Footer Placeholder 4">
+            <a:extLst>
+              <a:ext uri="{FF2B5EF4-FFF2-40B4-BE49-F238E27FC236}">
+                <a16:creationId xmlns:a16="http://schemas.microsoft.com/office/drawing/2014/main" id="{92EB6C08-F0AA-4D94-9A41-1416925A38AB}"/>
+              </a:ext>
+            </a:extLst>
+          </p:cNvPr>
+          <p:cNvSpPr>
+            <a:spLocks noGrp="1"/>
+          </p:cNvSpPr>
+          <p:nvPr>
+            <p:ph type="ftr" sz="quarter" idx="11"/>
+          </p:nvPr>
+        </p:nvSpPr>
+        <p:spPr/>
+        <p:txBody>
+          <a:bodyPr/>
+          <a:lstStyle/>
+          <a:p>
+            <a:r>
+              <a:rPr lang="en-US"/>
+              <a:t>Tilda Tooling - Copyright (c) 2018 CapsicoHealth, Inc. </a:t>
+            </a:r>
+          </a:p>
+        </p:txBody>
+      </p:sp>
+      <p:sp>
+        <p:nvSpPr>
+          <p:cNvPr id="6" name="Slide Number Placeholder 5">
+            <a:extLst>
+              <a:ext uri="{FF2B5EF4-FFF2-40B4-BE49-F238E27FC236}">
+                <a16:creationId xmlns:a16="http://schemas.microsoft.com/office/drawing/2014/main" id="{6640C87D-C2B8-480D-8ADC-BE4D594977BF}"/>
+              </a:ext>
+            </a:extLst>
+          </p:cNvPr>
+          <p:cNvSpPr>
+            <a:spLocks noGrp="1"/>
+          </p:cNvSpPr>
+          <p:nvPr>
+            <p:ph type="sldNum" sz="quarter" idx="12"/>
+          </p:nvPr>
+        </p:nvSpPr>
+        <p:spPr/>
+        <p:txBody>
+          <a:bodyPr/>
+          <a:lstStyle/>
+          <a:p>
+            <a:fld id="{C70A6BF2-D208-47CE-B3CD-F52E7B740884}" type="slidenum">
+              <a:rPr lang="en-US" smtClean="0"/>
+              <a:t>7</a:t>
+            </a:fld>
+            <a:endParaRPr lang="en-US"/>
+          </a:p>
+        </p:txBody>
+      </p:sp>
+    </p:spTree>
+    <p:extLst>
+      <p:ext uri="{BB962C8B-B14F-4D97-AF65-F5344CB8AC3E}">
+        <p14:creationId xmlns:p14="http://schemas.microsoft.com/office/powerpoint/2010/main" val="2356691327"/>
+      </p:ext>
+    </p:extLst>
+  </p:cSld>
+  <p:clrMapOvr>
+    <a:masterClrMapping/>
+  </p:clrMapOvr>
+</p:sld>
+</file>
+
 <file path=ppt/theme/theme1.xml><?xml version="1.0" encoding="utf-8"?>
 <a:theme xmlns:a="http://schemas.openxmlformats.org/drawingml/2006/main" name="Integral">
   <a:themeElements>

</xml_diff>

<commit_message>
#273 rename element sameas to sameAs
Also a few minor fixes and comments
</commit_message>
<xml_diff>
--- a/Tilda Tooling Architcture.pptx
+++ b/Tilda Tooling Architcture.pptx
@@ -5,7 +5,7 @@
     <p:sldMasterId id="2147483672" r:id="rId1"/>
   </p:sldMasterIdLst>
   <p:notesMasterIdLst>
-    <p:notesMasterId r:id="rId9"/>
+    <p:notesMasterId r:id="rId10"/>
   </p:notesMasterIdLst>
   <p:sldIdLst>
     <p:sldId id="256" r:id="rId2"/>
@@ -15,6 +15,7 @@
     <p:sldId id="259" r:id="rId6"/>
     <p:sldId id="261" r:id="rId7"/>
     <p:sldId id="262" r:id="rId8"/>
+    <p:sldId id="263" r:id="rId9"/>
   </p:sldIdLst>
   <p:sldSz cx="12192000" cy="6858000"/>
   <p:notesSz cx="6858000" cy="9144000"/>
@@ -203,7 +204,7 @@
           <a:p>
             <a:fld id="{74B032DE-BBB5-4125-9035-45E6835D9734}" type="datetimeFigureOut">
               <a:rPr lang="en-US" smtClean="0"/>
-              <a:t>2018-09-04</a:t>
+              <a:t>2018-09-19</a:t>
             </a:fld>
             <a:endParaRPr lang="en-US"/>
           </a:p>
@@ -23995,6 +23996,276 @@
 </p:sld>
 </file>
 
+<file path=ppt/slides/slide8.xml><?xml version="1.0" encoding="utf-8"?>
+<p:sld xmlns:a="http://schemas.openxmlformats.org/drawingml/2006/main" xmlns:r="http://schemas.openxmlformats.org/officeDocument/2006/relationships" xmlns:p="http://schemas.openxmlformats.org/presentationml/2006/main">
+  <p:cSld>
+    <p:spTree>
+      <p:nvGrpSpPr>
+        <p:cNvPr id="1" name=""/>
+        <p:cNvGrpSpPr/>
+        <p:nvPr/>
+      </p:nvGrpSpPr>
+      <p:grpSpPr>
+        <a:xfrm>
+          <a:off x="0" y="0"/>
+          <a:ext cx="0" cy="0"/>
+          <a:chOff x="0" y="0"/>
+          <a:chExt cx="0" cy="0"/>
+        </a:xfrm>
+      </p:grpSpPr>
+      <p:sp>
+        <p:nvSpPr>
+          <p:cNvPr id="2" name="Title 1">
+            <a:extLst>
+              <a:ext uri="{FF2B5EF4-FFF2-40B4-BE49-F238E27FC236}">
+                <a16:creationId xmlns:a16="http://schemas.microsoft.com/office/drawing/2014/main" id="{2700C615-3526-4EDE-AE5C-DE94CE347E03}"/>
+              </a:ext>
+            </a:extLst>
+          </p:cNvPr>
+          <p:cNvSpPr>
+            <a:spLocks noGrp="1"/>
+          </p:cNvSpPr>
+          <p:nvPr>
+            <p:ph type="title"/>
+          </p:nvPr>
+        </p:nvSpPr>
+        <p:spPr/>
+        <p:txBody>
+          <a:bodyPr>
+            <a:normAutofit fontScale="90000"/>
+          </a:bodyPr>
+          <a:lstStyle/>
+          <a:p>
+            <a:r>
+              <a:rPr lang="en-US" dirty="0"/>
+              <a:t>Parsing Tilda json file to </a:t>
+            </a:r>
+            <a:r>
+              <a:rPr lang="en-US" dirty="0" err="1"/>
+              <a:t>jointJS</a:t>
+            </a:r>
+            <a:endParaRPr lang="en-US" dirty="0"/>
+          </a:p>
+        </p:txBody>
+      </p:sp>
+      <p:sp>
+        <p:nvSpPr>
+          <p:cNvPr id="3" name="Content Placeholder 2">
+            <a:extLst>
+              <a:ext uri="{FF2B5EF4-FFF2-40B4-BE49-F238E27FC236}">
+                <a16:creationId xmlns:a16="http://schemas.microsoft.com/office/drawing/2014/main" id="{A8D3FAB0-F28E-4AD6-A529-1EB7F87B7680}"/>
+              </a:ext>
+            </a:extLst>
+          </p:cNvPr>
+          <p:cNvSpPr>
+            <a:spLocks noGrp="1"/>
+          </p:cNvSpPr>
+          <p:nvPr>
+            <p:ph idx="1"/>
+          </p:nvPr>
+        </p:nvSpPr>
+        <p:spPr/>
+        <p:txBody>
+          <a:bodyPr/>
+          <a:lstStyle/>
+          <a:p>
+            <a:r>
+              <a:rPr lang="en-US" dirty="0"/>
+              <a:t>tilda_schema_view.js</a:t>
+            </a:r>
+          </a:p>
+          <a:p>
+            <a:pPr lvl="1"/>
+            <a:r>
+              <a:rPr lang="en-US" dirty="0"/>
+              <a:t>.</a:t>
+            </a:r>
+            <a:r>
+              <a:rPr lang="en-US" dirty="0" err="1"/>
+              <a:t>newCanvas</a:t>
+            </a:r>
+            <a:r>
+              <a:rPr lang="en-US" dirty="0"/>
+              <a:t> -&gt; #</a:t>
+            </a:r>
+            <a:r>
+              <a:rPr lang="en-US" dirty="0" err="1"/>
+              <a:t>createCanvasD</a:t>
+            </a:r>
+            <a:r>
+              <a:rPr lang="en-US" dirty="0"/>
+              <a:t> -&gt; .</a:t>
+            </a:r>
+            <a:r>
+              <a:rPr lang="en-US" dirty="0" err="1"/>
+              <a:t>createCanvas</a:t>
+            </a:r>
+            <a:endParaRPr lang="en-US" dirty="0"/>
+          </a:p>
+          <a:p>
+            <a:pPr lvl="1"/>
+            <a:r>
+              <a:rPr lang="en-US" dirty="0" err="1"/>
+              <a:t>togglePapers</a:t>
+            </a:r>
+            <a:r>
+              <a:rPr lang="en-US" dirty="0"/>
+              <a:t>()</a:t>
+            </a:r>
+          </a:p>
+          <a:p>
+            <a:r>
+              <a:rPr lang="en-US" dirty="0"/>
+              <a:t>output/core/parser.js</a:t>
+            </a:r>
+          </a:p>
+          <a:p>
+            <a:pPr lvl="1"/>
+            <a:r>
+              <a:rPr lang="en-US" dirty="0"/>
+              <a:t>render()</a:t>
+            </a:r>
+          </a:p>
+          <a:p>
+            <a:pPr lvl="1"/>
+            <a:r>
+              <a:rPr lang="en-US" dirty="0"/>
+              <a:t>line #269: draw each elements</a:t>
+            </a:r>
+          </a:p>
+          <a:p>
+            <a:pPr lvl="1"/>
+            <a:r>
+              <a:rPr lang="en-US" dirty="0"/>
+              <a:t>Line #279: draw links</a:t>
+            </a:r>
+          </a:p>
+          <a:p>
+            <a:r>
+              <a:rPr lang="en-US" dirty="0" err="1"/>
+              <a:t>tildaCache</a:t>
+            </a:r>
+            <a:r>
+              <a:rPr lang="en-US" dirty="0"/>
+              <a:t> == _</a:t>
+            </a:r>
+            <a:r>
+              <a:rPr lang="en-US" dirty="0" err="1"/>
+              <a:t>tilda.XXX.graphInfo.json</a:t>
+            </a:r>
+            <a:endParaRPr lang="en-US" dirty="0"/>
+          </a:p>
+          <a:p>
+            <a:endParaRPr lang="en-US" dirty="0"/>
+          </a:p>
+          <a:p>
+            <a:pPr lvl="1"/>
+            <a:endParaRPr lang="en-US" dirty="0"/>
+          </a:p>
+          <a:p>
+            <a:pPr lvl="1"/>
+            <a:endParaRPr lang="en-US" dirty="0"/>
+          </a:p>
+        </p:txBody>
+      </p:sp>
+      <p:sp>
+        <p:nvSpPr>
+          <p:cNvPr id="4" name="Date Placeholder 3">
+            <a:extLst>
+              <a:ext uri="{FF2B5EF4-FFF2-40B4-BE49-F238E27FC236}">
+                <a16:creationId xmlns:a16="http://schemas.microsoft.com/office/drawing/2014/main" id="{12F87CEA-AF48-45A6-A23C-2DB583C735D7}"/>
+              </a:ext>
+            </a:extLst>
+          </p:cNvPr>
+          <p:cNvSpPr>
+            <a:spLocks noGrp="1"/>
+          </p:cNvSpPr>
+          <p:nvPr>
+            <p:ph type="dt" sz="half" idx="10"/>
+          </p:nvPr>
+        </p:nvSpPr>
+        <p:spPr/>
+        <p:txBody>
+          <a:bodyPr/>
+          <a:lstStyle/>
+          <a:p>
+            <a:r>
+              <a:rPr lang="en-US"/>
+              <a:t>2018-08-27</a:t>
+            </a:r>
+          </a:p>
+        </p:txBody>
+      </p:sp>
+      <p:sp>
+        <p:nvSpPr>
+          <p:cNvPr id="5" name="Footer Placeholder 4">
+            <a:extLst>
+              <a:ext uri="{FF2B5EF4-FFF2-40B4-BE49-F238E27FC236}">
+                <a16:creationId xmlns:a16="http://schemas.microsoft.com/office/drawing/2014/main" id="{DFB19B10-B139-4A39-A304-156E292D39DB}"/>
+              </a:ext>
+            </a:extLst>
+          </p:cNvPr>
+          <p:cNvSpPr>
+            <a:spLocks noGrp="1"/>
+          </p:cNvSpPr>
+          <p:nvPr>
+            <p:ph type="ftr" sz="quarter" idx="11"/>
+          </p:nvPr>
+        </p:nvSpPr>
+        <p:spPr/>
+        <p:txBody>
+          <a:bodyPr/>
+          <a:lstStyle/>
+          <a:p>
+            <a:r>
+              <a:rPr lang="en-US"/>
+              <a:t>Tilda Tooling - Copyright (c) 2018 CapsicoHealth, Inc. </a:t>
+            </a:r>
+          </a:p>
+        </p:txBody>
+      </p:sp>
+      <p:sp>
+        <p:nvSpPr>
+          <p:cNvPr id="6" name="Slide Number Placeholder 5">
+            <a:extLst>
+              <a:ext uri="{FF2B5EF4-FFF2-40B4-BE49-F238E27FC236}">
+                <a16:creationId xmlns:a16="http://schemas.microsoft.com/office/drawing/2014/main" id="{106C80AC-EB79-4614-BD6B-1890DA5E0995}"/>
+              </a:ext>
+            </a:extLst>
+          </p:cNvPr>
+          <p:cNvSpPr>
+            <a:spLocks noGrp="1"/>
+          </p:cNvSpPr>
+          <p:nvPr>
+            <p:ph type="sldNum" sz="quarter" idx="12"/>
+          </p:nvPr>
+        </p:nvSpPr>
+        <p:spPr/>
+        <p:txBody>
+          <a:bodyPr/>
+          <a:lstStyle/>
+          <a:p>
+            <a:fld id="{C70A6BF2-D208-47CE-B3CD-F52E7B740884}" type="slidenum">
+              <a:rPr lang="en-US" smtClean="0"/>
+              <a:t>8</a:t>
+            </a:fld>
+            <a:endParaRPr lang="en-US"/>
+          </a:p>
+        </p:txBody>
+      </p:sp>
+    </p:spTree>
+    <p:extLst>
+      <p:ext uri="{BB962C8B-B14F-4D97-AF65-F5344CB8AC3E}">
+        <p14:creationId xmlns:p14="http://schemas.microsoft.com/office/powerpoint/2010/main" val="48074185"/>
+      </p:ext>
+    </p:extLst>
+  </p:cSld>
+  <p:clrMapOvr>
+    <a:masterClrMapping/>
+  </p:clrMapOvr>
+</p:sld>
+</file>
+
 <file path=ppt/theme/theme1.xml><?xml version="1.0" encoding="utf-8"?>
 <a:theme xmlns:a="http://schemas.openxmlformats.org/drawingml/2006/main" name="Integral">
   <a:themeElements>

</xml_diff>